<commit_message>
Save state of slides after week 1
</commit_message>
<xml_diff>
--- a/2016/recap_and_warmup_slides.pptx
+++ b/2016/recap_and_warmup_slides.pptx
@@ -5,10 +5,10 @@
     <p:sldMasterId id="2147483650" r:id="rId1"/>
   </p:sldMasterIdLst>
   <p:notesMasterIdLst>
-    <p:notesMasterId r:id="rId12"/>
+    <p:notesMasterId r:id="rId13"/>
   </p:notesMasterIdLst>
   <p:handoutMasterIdLst>
-    <p:handoutMasterId r:id="rId13"/>
+    <p:handoutMasterId r:id="rId14"/>
   </p:handoutMasterIdLst>
   <p:sldIdLst>
     <p:sldId id="454" r:id="rId2"/>
@@ -20,7 +20,8 @@
     <p:sldId id="467" r:id="rId8"/>
     <p:sldId id="468" r:id="rId9"/>
     <p:sldId id="469" r:id="rId10"/>
-    <p:sldId id="471" r:id="rId11"/>
+    <p:sldId id="472" r:id="rId11"/>
+    <p:sldId id="471" r:id="rId12"/>
   </p:sldIdLst>
   <p:sldSz cx="9144000" cy="6858000" type="screen4x3"/>
   <p:notesSz cx="7099300" cy="10234613"/>
@@ -203,6 +204,7 @@
             <p14:sldId id="467"/>
             <p14:sldId id="468"/>
             <p14:sldId id="469"/>
+            <p14:sldId id="472"/>
             <p14:sldId id="471"/>
           </p14:sldIdLst>
         </p14:section>
@@ -9814,7 +9816,7 @@
           <a:graphicData uri="http://schemas.openxmlformats.org/presentationml/2006/ole">
             <mc:AlternateContent xmlns:mc="http://schemas.openxmlformats.org/markup-compatibility/2006">
               <mc:Choice xmlns:v="urn:schemas-microsoft-com:vml" Requires="v">
-                <p:oleObj spid="_x0000_s1950" r:id="rId16" imgW="1038370" imgH="980952" progId="">
+                <p:oleObj spid="_x0000_s1953" r:id="rId16" imgW="1038370" imgH="980952" progId="">
                   <p:embed/>
                 </p:oleObj>
               </mc:Choice>
@@ -10252,7 +10254,7 @@
                 </a:lnSpc>
                 <a:defRPr/>
               </a:pPr>
-              <a:t>07.09.2016</a:t>
+              <a:t>08.09.2016</a:t>
             </a:fld>
             <a:r>
               <a:rPr lang="en-GB" altLang="de-DE" sz="1000" smtClean="0">
@@ -10813,6 +10815,186 @@
           <a:lstStyle/>
           <a:p>
             <a:r>
+              <a:rPr lang="de-DE" altLang="de-DE"/>
+              <a:t>Tag 6: Evaluationsfragen</a:t>
+            </a:r>
+            <a:endParaRPr lang="en-US"/>
+          </a:p>
+        </p:txBody>
+      </p:sp>
+      <p:sp>
+        <p:nvSpPr>
+          <p:cNvPr id="3" name="Inhaltsplatzhalter 2"/>
+          <p:cNvSpPr>
+            <a:spLocks noGrp="1"/>
+          </p:cNvSpPr>
+          <p:nvPr>
+            <p:ph idx="1"/>
+          </p:nvPr>
+        </p:nvSpPr>
+        <p:spPr/>
+        <p:txBody>
+          <a:bodyPr/>
+          <a:lstStyle/>
+          <a:p>
+            <a:pPr>
+              <a:tabLst>
+                <a:tab pos="2155825" algn="l"/>
+              </a:tabLst>
+            </a:pPr>
+            <a:r>
+              <a:rPr lang="en-US" b="1"/>
+              <a:t>Hinweise zur Klausur</a:t>
+            </a:r>
+          </a:p>
+          <a:p>
+            <a:pPr lvl="1">
+              <a:tabLst>
+                <a:tab pos="2155825" algn="l"/>
+              </a:tabLst>
+            </a:pPr>
+            <a:r>
+              <a:rPr lang="en-US"/>
+              <a:t>Wir gehen davon aus, dass </a:t>
+            </a:r>
+            <a:r>
+              <a:rPr lang="en-US" b="1"/>
+              <a:t>alle nicht-optionalen Übungen </a:t>
+            </a:r>
+            <a:r>
+              <a:rPr lang="en-US"/>
+              <a:t>der </a:t>
+            </a:r>
+            <a:r>
+              <a:rPr lang="en-US" b="1"/>
+              <a:t>Tage 1-4 </a:t>
+            </a:r>
+            <a:r>
+              <a:rPr lang="en-US"/>
+              <a:t>bearbeitet wurden </a:t>
+            </a:r>
+            <a:r>
+              <a:rPr lang="en-US" b="1"/>
+              <a:t>und</a:t>
+            </a:r>
+            <a:r>
+              <a:rPr lang="en-US"/>
+              <a:t> alle Folien soweit verstanden wurden.</a:t>
+            </a:r>
+          </a:p>
+          <a:p>
+            <a:pPr lvl="1">
+              <a:tabLst>
+                <a:tab pos="2155825" algn="l"/>
+              </a:tabLst>
+            </a:pPr>
+            <a:r>
+              <a:rPr lang="en-US"/>
+              <a:t>Es wird ein </a:t>
+            </a:r>
+            <a:r>
+              <a:rPr lang="en-US" b="1"/>
+              <a:t>Codehandout</a:t>
+            </a:r>
+            <a:r>
+              <a:rPr lang="en-US"/>
+              <a:t> geben, in dem für bestimmte Funktionen/Datentypen/Methoden eine Beschreibung vorliegt.</a:t>
+            </a:r>
+          </a:p>
+          <a:p>
+            <a:pPr lvl="2">
+              <a:tabLst>
+                <a:tab pos="2155825" algn="l"/>
+              </a:tabLst>
+            </a:pPr>
+            <a:r>
+              <a:rPr lang="en-US"/>
+              <a:t>NICHT zu erwarten ist bspw. </a:t>
+            </a:r>
+            <a:r>
+              <a:rPr lang="en-US">
+                <a:latin typeface="Consolas" panose="020B0609020204030204" pitchFamily="49" charset="0"/>
+                <a:cs typeface="Consolas" panose="020B0609020204030204" pitchFamily="49" charset="0"/>
+              </a:rPr>
+              <a:t>std::vector&lt;T&gt;::push_back</a:t>
+            </a:r>
+          </a:p>
+          <a:p>
+            <a:pPr lvl="2">
+              <a:tabLst>
+                <a:tab pos="2155825" algn="l"/>
+              </a:tabLst>
+            </a:pPr>
+            <a:r>
+              <a:rPr lang="en-US"/>
+              <a:t>Zu erwarten ist bspw. </a:t>
+            </a:r>
+            <a:r>
+              <a:rPr lang="en-US">
+                <a:latin typeface="Consolas" panose="020B0609020204030204" pitchFamily="49" charset="0"/>
+                <a:cs typeface="Consolas" panose="020B0609020204030204" pitchFamily="49" charset="0"/>
+              </a:rPr>
+              <a:t>std::string::find</a:t>
+            </a:r>
+          </a:p>
+          <a:p>
+            <a:endParaRPr lang="en-US"/>
+          </a:p>
+        </p:txBody>
+      </p:sp>
+    </p:spTree>
+    <p:extLst>
+      <p:ext uri="{BB962C8B-B14F-4D97-AF65-F5344CB8AC3E}">
+        <p14:creationId xmlns:p14="http://schemas.microsoft.com/office/powerpoint/2010/main" val="1791550600"/>
+      </p:ext>
+    </p:extLst>
+  </p:cSld>
+  <p:clrMapOvr>
+    <a:masterClrMapping/>
+  </p:clrMapOvr>
+  <p:timing>
+    <p:tnLst>
+      <p:par>
+        <p:cTn id="1" dur="indefinite" restart="never" nodeType="tmRoot"/>
+      </p:par>
+    </p:tnLst>
+  </p:timing>
+</p:sld>
+</file>
+
+<file path=ppt/slides/slide11.xml><?xml version="1.0" encoding="utf-8"?>
+<p:sld xmlns:a="http://schemas.openxmlformats.org/drawingml/2006/main" xmlns:r="http://schemas.openxmlformats.org/officeDocument/2006/relationships" xmlns:p="http://schemas.openxmlformats.org/presentationml/2006/main">
+  <p:cSld>
+    <p:spTree>
+      <p:nvGrpSpPr>
+        <p:cNvPr id="1" name=""/>
+        <p:cNvGrpSpPr/>
+        <p:nvPr/>
+      </p:nvGrpSpPr>
+      <p:grpSpPr>
+        <a:xfrm>
+          <a:off x="0" y="0"/>
+          <a:ext cx="0" cy="0"/>
+          <a:chOff x="0" y="0"/>
+          <a:chExt cx="0" cy="0"/>
+        </a:xfrm>
+      </p:grpSpPr>
+      <p:sp>
+        <p:nvSpPr>
+          <p:cNvPr id="2" name="Titel 1"/>
+          <p:cNvSpPr>
+            <a:spLocks noGrp="1"/>
+          </p:cNvSpPr>
+          <p:nvPr>
+            <p:ph type="title"/>
+          </p:nvPr>
+        </p:nvSpPr>
+        <p:spPr/>
+        <p:txBody>
+          <a:bodyPr/>
+          <a:lstStyle/>
+          <a:p>
+            <a:r>
               <a:rPr lang="en-US" smtClean="0"/>
               <a:t>Block 2</a:t>
             </a:r>
@@ -10849,6 +11031,13 @@
   <p:clrMapOvr>
     <a:masterClrMapping/>
   </p:clrMapOvr>
+  <p:timing>
+    <p:tnLst>
+      <p:par>
+        <p:cTn id="1" dur="indefinite" restart="never" nodeType="tmRoot"/>
+      </p:par>
+    </p:tnLst>
+  </p:timing>
 </p:sld>
 </file>
 
@@ -12787,8 +12976,34 @@
             <a:pPr lvl="1"/>
             <a:r>
               <a:rPr lang="en-US" smtClean="0"/>
-              <a:t>Stärkerer Fokus auf C++(11) legen (= weniger Fokus auf C)?</a:t>
-            </a:r>
+              <a:t>Stärkerer Fokus auf C++(11) legen (= weniger Fokus auf C</a:t>
+            </a:r>
+            <a:r>
+              <a:rPr lang="en-US" smtClean="0"/>
+              <a:t>)?</a:t>
+            </a:r>
+          </a:p>
+          <a:p>
+            <a:pPr lvl="2"/>
+            <a:r>
+              <a:rPr lang="en-US" smtClean="0"/>
+              <a:t>"trifft zu" = mehr C++</a:t>
+            </a:r>
+          </a:p>
+          <a:p>
+            <a:pPr lvl="2"/>
+            <a:r>
+              <a:rPr lang="en-US" smtClean="0"/>
+              <a:t>"Mitte" = gleich lassen</a:t>
+            </a:r>
+          </a:p>
+          <a:p>
+            <a:pPr lvl="2"/>
+            <a:r>
+              <a:rPr lang="en-US" smtClean="0"/>
+              <a:t>"trifft nicht zu" = mehr C</a:t>
+            </a:r>
+            <a:endParaRPr lang="en-US" smtClean="0"/>
           </a:p>
           <a:p>
             <a:pPr lvl="1"/>
@@ -12827,9 +13042,21 @@
             </a:pPr>
             <a:r>
               <a:rPr lang="en-US" smtClean="0"/>
-              <a:t>"trifft nicht zu" 	= Sehr erfahrener C++-Programmierer</a:t>
-            </a:r>
-            <a:endParaRPr lang="en-US" dirty="0"/>
+              <a:t>"trifft nicht zu" 	= Sehr erfahrener C++-</a:t>
+            </a:r>
+            <a:r>
+              <a:rPr lang="en-US" smtClean="0"/>
+              <a:t>Programmierer</a:t>
+            </a:r>
+          </a:p>
+          <a:p>
+            <a:pPr marL="350838" lvl="2" indent="0">
+              <a:buNone/>
+              <a:tabLst>
+                <a:tab pos="2155825" algn="l"/>
+              </a:tabLst>
+            </a:pPr>
+            <a:endParaRPr lang="en-US"/>
           </a:p>
         </p:txBody>
       </p:sp>

</xml_diff>

<commit_message>
Bugfixes in lecture and notes for day 3
</commit_message>
<xml_diff>
--- a/2016/recap_and_warmup_slides.pptx
+++ b/2016/recap_and_warmup_slides.pptx
@@ -5,23 +5,24 @@
     <p:sldMasterId id="2147483650" r:id="rId1"/>
   </p:sldMasterIdLst>
   <p:notesMasterIdLst>
-    <p:notesMasterId r:id="rId13"/>
+    <p:notesMasterId r:id="rId14"/>
   </p:notesMasterIdLst>
   <p:handoutMasterIdLst>
-    <p:handoutMasterId r:id="rId14"/>
+    <p:handoutMasterId r:id="rId15"/>
   </p:handoutMasterIdLst>
   <p:sldIdLst>
     <p:sldId id="454" r:id="rId2"/>
     <p:sldId id="470" r:id="rId3"/>
     <p:sldId id="463" r:id="rId4"/>
-    <p:sldId id="456" r:id="rId5"/>
-    <p:sldId id="457" r:id="rId6"/>
-    <p:sldId id="465" r:id="rId7"/>
-    <p:sldId id="467" r:id="rId8"/>
-    <p:sldId id="468" r:id="rId9"/>
-    <p:sldId id="469" r:id="rId10"/>
-    <p:sldId id="472" r:id="rId11"/>
-    <p:sldId id="471" r:id="rId12"/>
+    <p:sldId id="473" r:id="rId5"/>
+    <p:sldId id="456" r:id="rId6"/>
+    <p:sldId id="457" r:id="rId7"/>
+    <p:sldId id="465" r:id="rId8"/>
+    <p:sldId id="467" r:id="rId9"/>
+    <p:sldId id="468" r:id="rId10"/>
+    <p:sldId id="469" r:id="rId11"/>
+    <p:sldId id="472" r:id="rId12"/>
+    <p:sldId id="471" r:id="rId13"/>
   </p:sldIdLst>
   <p:sldSz cx="9144000" cy="6858000" type="screen4x3"/>
   <p:notesSz cx="7099300" cy="10234613"/>
@@ -198,6 +199,7 @@
             <p14:sldId id="454"/>
             <p14:sldId id="470"/>
             <p14:sldId id="463"/>
+            <p14:sldId id="473"/>
             <p14:sldId id="456"/>
             <p14:sldId id="457"/>
             <p14:sldId id="465"/>
@@ -1998,7 +2000,7 @@
               <a:pPr>
                 <a:defRPr/>
               </a:pPr>
-              <a:t>4</a:t>
+              <a:t>5</a:t>
             </a:fld>
             <a:endParaRPr lang="en-US"/>
           </a:p>
@@ -2894,7 +2896,7 @@
                 <a:latin typeface="Stafford" pitchFamily="2" charset="0"/>
               </a:rPr>
               <a:pPr eaLnBrk="1" hangingPunct="1"/>
-              <a:t>6</a:t>
+              <a:t>7</a:t>
             </a:fld>
             <a:endParaRPr lang="en-US" altLang="de-DE" smtClean="0">
               <a:solidFill>
@@ -3714,7 +3716,7 @@
                 <a:latin typeface="Stafford" pitchFamily="2" charset="0"/>
               </a:rPr>
               <a:pPr eaLnBrk="1" hangingPunct="1"/>
-              <a:t>7</a:t>
+              <a:t>8</a:t>
             </a:fld>
             <a:endParaRPr lang="en-US" altLang="de-DE" smtClean="0">
               <a:solidFill>
@@ -4534,7 +4536,7 @@
                 <a:latin typeface="Stafford" pitchFamily="2" charset="0"/>
               </a:rPr>
               <a:pPr eaLnBrk="1" hangingPunct="1"/>
-              <a:t>8</a:t>
+              <a:t>9</a:t>
             </a:fld>
             <a:endParaRPr lang="en-US" altLang="de-DE" smtClean="0">
               <a:solidFill>
@@ -5354,7 +5356,7 @@
                 <a:latin typeface="Stafford" pitchFamily="2" charset="0"/>
               </a:rPr>
               <a:pPr eaLnBrk="1" hangingPunct="1"/>
-              <a:t>9</a:t>
+              <a:t>10</a:t>
             </a:fld>
             <a:endParaRPr lang="en-US" altLang="de-DE" smtClean="0">
               <a:solidFill>
@@ -9816,7 +9818,7 @@
           <a:graphicData uri="http://schemas.openxmlformats.org/presentationml/2006/ole">
             <mc:AlternateContent xmlns:mc="http://schemas.openxmlformats.org/markup-compatibility/2006">
               <mc:Choice xmlns:v="urn:schemas-microsoft-com:vml" Requires="v">
-                <p:oleObj spid="_x0000_s1953" r:id="rId16" imgW="1038370" imgH="980952" progId="">
+                <p:oleObj spid="_x0000_s1958" r:id="rId16" imgW="1038370" imgH="980952" progId="">
                   <p:embed/>
                 </p:oleObj>
               </mc:Choice>
@@ -10254,7 +10256,7 @@
                 </a:lnSpc>
                 <a:defRPr/>
               </a:pPr>
-              <a:t>08.09.2016</a:t>
+              <a:t>19.09.2016</a:t>
             </a:fld>
             <a:r>
               <a:rPr lang="en-GB" altLang="de-DE" sz="1000" smtClean="0">
@@ -10801,6 +10803,173 @@
       </p:grpSpPr>
       <p:sp>
         <p:nvSpPr>
+          <p:cNvPr id="15362" name="Titel 1"/>
+          <p:cNvSpPr>
+            <a:spLocks noGrp="1"/>
+          </p:cNvSpPr>
+          <p:nvPr>
+            <p:ph type="title"/>
+          </p:nvPr>
+        </p:nvSpPr>
+        <p:spPr/>
+        <p:txBody>
+          <a:bodyPr/>
+          <a:lstStyle/>
+          <a:p>
+            <a:r>
+              <a:rPr lang="de-DE" altLang="de-DE" smtClean="0"/>
+              <a:t>Tag 6: Evaluationsfragen</a:t>
+            </a:r>
+            <a:endParaRPr lang="de-DE" altLang="de-DE" dirty="0" smtClean="0"/>
+          </a:p>
+        </p:txBody>
+      </p:sp>
+      <p:sp>
+        <p:nvSpPr>
+          <p:cNvPr id="2" name="Inhaltsplatzhalter 1"/>
+          <p:cNvSpPr>
+            <a:spLocks noGrp="1"/>
+          </p:cNvSpPr>
+          <p:nvPr>
+            <p:ph idx="1"/>
+          </p:nvPr>
+        </p:nvSpPr>
+        <p:spPr/>
+        <p:txBody>
+          <a:bodyPr/>
+          <a:lstStyle/>
+          <a:p>
+            <a:r>
+              <a:rPr lang="en-US" b="1" smtClean="0"/>
+              <a:t>Fragen für die Evaluation</a:t>
+            </a:r>
+          </a:p>
+          <a:p>
+            <a:pPr lvl="1"/>
+            <a:r>
+              <a:rPr lang="en-US" smtClean="0"/>
+              <a:t>Stärkerer Fokus auf C++(11) legen (= weniger Fokus auf C)?</a:t>
+            </a:r>
+          </a:p>
+          <a:p>
+            <a:pPr lvl="2"/>
+            <a:r>
+              <a:rPr lang="en-US" smtClean="0"/>
+              <a:t>"trifft zu" = mehr C++</a:t>
+            </a:r>
+          </a:p>
+          <a:p>
+            <a:pPr lvl="2"/>
+            <a:r>
+              <a:rPr lang="en-US" smtClean="0"/>
+              <a:t>"Mitte" = gleich lassen</a:t>
+            </a:r>
+          </a:p>
+          <a:p>
+            <a:pPr lvl="2"/>
+            <a:r>
+              <a:rPr lang="en-US" smtClean="0"/>
+              <a:t>"trifft nicht zu" = mehr C</a:t>
+            </a:r>
+          </a:p>
+          <a:p>
+            <a:pPr lvl="1"/>
+            <a:r>
+              <a:rPr lang="en-US" smtClean="0"/>
+              <a:t>Ich hatte vorher keine C++-Kenntnisse</a:t>
+            </a:r>
+          </a:p>
+          <a:p>
+            <a:pPr lvl="2">
+              <a:tabLst>
+                <a:tab pos="2155825" algn="l"/>
+              </a:tabLst>
+            </a:pPr>
+            <a:r>
+              <a:rPr lang="en-US" smtClean="0"/>
+              <a:t>"trifft zu" 	= Keine Vorkenntnisse</a:t>
+            </a:r>
+          </a:p>
+          <a:p>
+            <a:pPr lvl="2">
+              <a:tabLst>
+                <a:tab pos="2155825" algn="l"/>
+              </a:tabLst>
+            </a:pPr>
+            <a:r>
+              <a:rPr lang="en-US" smtClean="0"/>
+              <a:t>"Mitte"	= Eigene kleinere Projekte</a:t>
+            </a:r>
+          </a:p>
+          <a:p>
+            <a:pPr lvl="2">
+              <a:tabLst>
+                <a:tab pos="2155825" algn="l"/>
+              </a:tabLst>
+            </a:pPr>
+            <a:r>
+              <a:rPr lang="en-US" smtClean="0"/>
+              <a:t>"trifft nicht zu" 	= Sehr erfahrener C++-Programmierer</a:t>
+            </a:r>
+          </a:p>
+          <a:p>
+            <a:pPr marL="350838" lvl="2" indent="0">
+              <a:buNone/>
+              <a:tabLst>
+                <a:tab pos="2155825" algn="l"/>
+              </a:tabLst>
+            </a:pPr>
+            <a:endParaRPr lang="en-US"/>
+          </a:p>
+        </p:txBody>
+      </p:sp>
+    </p:spTree>
+    <p:extLst>
+      <p:ext uri="{BB962C8B-B14F-4D97-AF65-F5344CB8AC3E}">
+        <p14:creationId xmlns:p14="http://schemas.microsoft.com/office/powerpoint/2010/main" val="509479147"/>
+      </p:ext>
+    </p:extLst>
+  </p:cSld>
+  <p:clrMapOvr>
+    <a:masterClrMapping/>
+  </p:clrMapOvr>
+  <mc:AlternateContent xmlns:mc="http://schemas.openxmlformats.org/markup-compatibility/2006" xmlns:p14="http://schemas.microsoft.com/office/powerpoint/2010/main">
+    <mc:Choice Requires="p14">
+      <p:transition spd="slow" p14:dur="2000"/>
+    </mc:Choice>
+    <mc:Fallback xmlns="">
+      <p:transition spd="slow"/>
+    </mc:Fallback>
+  </mc:AlternateContent>
+  <p:timing>
+    <p:tnLst>
+      <p:par>
+        <p:cTn id="1" dur="indefinite" restart="never" nodeType="tmRoot"/>
+      </p:par>
+    </p:tnLst>
+  </p:timing>
+</p:sld>
+</file>
+
+<file path=ppt/slides/slide11.xml><?xml version="1.0" encoding="utf-8"?>
+<p:sld xmlns:a="http://schemas.openxmlformats.org/drawingml/2006/main" xmlns:r="http://schemas.openxmlformats.org/officeDocument/2006/relationships" xmlns:p="http://schemas.openxmlformats.org/presentationml/2006/main">
+  <p:cSld>
+    <p:spTree>
+      <p:nvGrpSpPr>
+        <p:cNvPr id="1" name=""/>
+        <p:cNvGrpSpPr/>
+        <p:nvPr/>
+      </p:nvGrpSpPr>
+      <p:grpSpPr>
+        <a:xfrm>
+          <a:off x="0" y="0"/>
+          <a:ext cx="0" cy="0"/>
+          <a:chOff x="0" y="0"/>
+          <a:chExt cx="0" cy="0"/>
+        </a:xfrm>
+      </p:grpSpPr>
+      <p:sp>
+        <p:nvSpPr>
           <p:cNvPr id="2" name="Titel 1"/>
           <p:cNvSpPr>
             <a:spLocks noGrp="1"/>
@@ -10962,7 +11131,7 @@
 </p:sld>
 </file>
 
-<file path=ppt/slides/slide11.xml><?xml version="1.0" encoding="utf-8"?>
+<file path=ppt/slides/slide12.xml><?xml version="1.0" encoding="utf-8"?>
 <p:sld xmlns:a="http://schemas.openxmlformats.org/drawingml/2006/main" xmlns:r="http://schemas.openxmlformats.org/officeDocument/2006/relationships" xmlns:p="http://schemas.openxmlformats.org/presentationml/2006/main">
   <p:cSld>
     <p:spTree>
@@ -11498,8 +11667,413 @@
           <a:lstStyle/>
           <a:p>
             <a:r>
-              <a:rPr lang="en-US" dirty="0"/>
-              <a:t>Tag 2: </a:t>
+              <a:rPr lang="en-US"/>
+              <a:t>Tag 3: Rückschau und Warm Up </a:t>
+            </a:r>
+            <a:r>
+              <a:rPr lang="en-US"/>
+              <a:t>(</a:t>
+            </a:r>
+            <a:r>
+              <a:rPr lang="en-US" smtClean="0"/>
+              <a:t>I)</a:t>
+            </a:r>
+            <a:endParaRPr lang="en-US"/>
+          </a:p>
+        </p:txBody>
+      </p:sp>
+      <p:sp>
+        <p:nvSpPr>
+          <p:cNvPr id="3" name="Inhaltsplatzhalter 2"/>
+          <p:cNvSpPr>
+            <a:spLocks noGrp="1"/>
+          </p:cNvSpPr>
+          <p:nvPr>
+            <p:ph idx="1"/>
+          </p:nvPr>
+        </p:nvSpPr>
+        <p:spPr/>
+        <p:txBody>
+          <a:bodyPr/>
+          <a:lstStyle/>
+          <a:p>
+            <a:r>
+              <a:rPr lang="en-US" b="1" smtClean="0"/>
+              <a:t>Korrektur zu C++-Referenzen</a:t>
+            </a:r>
+          </a:p>
+          <a:p>
+            <a:pPr lvl="1"/>
+            <a:r>
+              <a:rPr lang="en-US" smtClean="0"/>
+              <a:t>Konzeptionell: Referenzen sind ein Alias und haben keine eigene Adresse</a:t>
+            </a:r>
+          </a:p>
+          <a:p>
+            <a:pPr lvl="1"/>
+            <a:r>
+              <a:rPr lang="en-US" smtClean="0"/>
+              <a:t>Implementierungstechnisch:</a:t>
+            </a:r>
+          </a:p>
+          <a:p>
+            <a:pPr lvl="2"/>
+            <a:r>
+              <a:rPr lang="en-US" smtClean="0"/>
+              <a:t>Referenzen können (natürlich!) Speicher belegen.</a:t>
+            </a:r>
+          </a:p>
+          <a:p>
+            <a:pPr lvl="2"/>
+            <a:r>
+              <a:rPr lang="en-US" smtClean="0"/>
+              <a:t>Beispiele:</a:t>
+            </a:r>
+          </a:p>
+          <a:p>
+            <a:pPr lvl="3"/>
+            <a:r>
+              <a:rPr lang="en-US" smtClean="0"/>
+              <a:t>Übergabe an bereits gelinkte Bibliotheken</a:t>
+            </a:r>
+          </a:p>
+          <a:p>
+            <a:pPr lvl="3"/>
+            <a:r>
+              <a:rPr lang="en-US" smtClean="0"/>
+              <a:t>Als Attribute von Klassen</a:t>
+            </a:r>
+          </a:p>
+          <a:p>
+            <a:pPr lvl="2"/>
+            <a:endParaRPr lang="en-US" smtClean="0"/>
+          </a:p>
+          <a:p>
+            <a:pPr lvl="1"/>
+            <a:endParaRPr lang="en-US"/>
+          </a:p>
+        </p:txBody>
+      </p:sp>
+    </p:spTree>
+    <p:extLst>
+      <p:ext uri="{BB962C8B-B14F-4D97-AF65-F5344CB8AC3E}">
+        <p14:creationId xmlns:p14="http://schemas.microsoft.com/office/powerpoint/2010/main" val="1182472654"/>
+      </p:ext>
+    </p:extLst>
+  </p:cSld>
+  <p:clrMapOvr>
+    <a:masterClrMapping/>
+  </p:clrMapOvr>
+  <p:timing>
+    <p:tnLst>
+      <p:par>
+        <p:cTn id="1" dur="indefinite" restart="never" nodeType="tmRoot">
+          <p:childTnLst>
+            <p:seq concurrent="1" nextAc="seek">
+              <p:cTn id="2" dur="indefinite" nodeType="mainSeq">
+                <p:childTnLst>
+                  <p:par>
+                    <p:cTn id="3" fill="hold">
+                      <p:stCondLst>
+                        <p:cond delay="indefinite"/>
+                      </p:stCondLst>
+                      <p:childTnLst>
+                        <p:par>
+                          <p:cTn id="4" fill="hold">
+                            <p:stCondLst>
+                              <p:cond delay="0"/>
+                            </p:stCondLst>
+                            <p:childTnLst>
+                              <p:par>
+                                <p:cTn id="5" presetID="1" presetClass="entr" presetSubtype="0" fill="hold" grpId="0" nodeType="clickEffect">
+                                  <p:stCondLst>
+                                    <p:cond delay="0"/>
+                                  </p:stCondLst>
+                                  <p:childTnLst>
+                                    <p:set>
+                                      <p:cBhvr>
+                                        <p:cTn id="6" dur="1" fill="hold">
+                                          <p:stCondLst>
+                                            <p:cond delay="0"/>
+                                          </p:stCondLst>
+                                        </p:cTn>
+                                        <p:tgtEl>
+                                          <p:spTgt spid="3">
+                                            <p:txEl>
+                                              <p:pRg st="0" end="0"/>
+                                            </p:txEl>
+                                          </p:spTgt>
+                                        </p:tgtEl>
+                                        <p:attrNameLst>
+                                          <p:attrName>style.visibility</p:attrName>
+                                        </p:attrNameLst>
+                                      </p:cBhvr>
+                                      <p:to>
+                                        <p:strVal val="visible"/>
+                                      </p:to>
+                                    </p:set>
+                                  </p:childTnLst>
+                                </p:cTn>
+                              </p:par>
+                              <p:par>
+                                <p:cTn id="7" presetID="1" presetClass="entr" presetSubtype="0" fill="hold" grpId="0" nodeType="withEffect">
+                                  <p:stCondLst>
+                                    <p:cond delay="0"/>
+                                  </p:stCondLst>
+                                  <p:childTnLst>
+                                    <p:set>
+                                      <p:cBhvr>
+                                        <p:cTn id="8" dur="1" fill="hold">
+                                          <p:stCondLst>
+                                            <p:cond delay="0"/>
+                                          </p:stCondLst>
+                                        </p:cTn>
+                                        <p:tgtEl>
+                                          <p:spTgt spid="3">
+                                            <p:txEl>
+                                              <p:pRg st="1" end="1"/>
+                                            </p:txEl>
+                                          </p:spTgt>
+                                        </p:tgtEl>
+                                        <p:attrNameLst>
+                                          <p:attrName>style.visibility</p:attrName>
+                                        </p:attrNameLst>
+                                      </p:cBhvr>
+                                      <p:to>
+                                        <p:strVal val="visible"/>
+                                      </p:to>
+                                    </p:set>
+                                  </p:childTnLst>
+                                </p:cTn>
+                              </p:par>
+                              <p:par>
+                                <p:cTn id="9" presetID="1" presetClass="entr" presetSubtype="0" fill="hold" grpId="0" nodeType="withEffect">
+                                  <p:stCondLst>
+                                    <p:cond delay="0"/>
+                                  </p:stCondLst>
+                                  <p:childTnLst>
+                                    <p:set>
+                                      <p:cBhvr>
+                                        <p:cTn id="10" dur="1" fill="hold">
+                                          <p:stCondLst>
+                                            <p:cond delay="0"/>
+                                          </p:stCondLst>
+                                        </p:cTn>
+                                        <p:tgtEl>
+                                          <p:spTgt spid="3">
+                                            <p:txEl>
+                                              <p:pRg st="2" end="2"/>
+                                            </p:txEl>
+                                          </p:spTgt>
+                                        </p:tgtEl>
+                                        <p:attrNameLst>
+                                          <p:attrName>style.visibility</p:attrName>
+                                        </p:attrNameLst>
+                                      </p:cBhvr>
+                                      <p:to>
+                                        <p:strVal val="visible"/>
+                                      </p:to>
+                                    </p:set>
+                                  </p:childTnLst>
+                                </p:cTn>
+                              </p:par>
+                              <p:par>
+                                <p:cTn id="11" presetID="1" presetClass="entr" presetSubtype="0" fill="hold" grpId="0" nodeType="withEffect">
+                                  <p:stCondLst>
+                                    <p:cond delay="0"/>
+                                  </p:stCondLst>
+                                  <p:childTnLst>
+                                    <p:set>
+                                      <p:cBhvr>
+                                        <p:cTn id="12" dur="1" fill="hold">
+                                          <p:stCondLst>
+                                            <p:cond delay="0"/>
+                                          </p:stCondLst>
+                                        </p:cTn>
+                                        <p:tgtEl>
+                                          <p:spTgt spid="3">
+                                            <p:txEl>
+                                              <p:pRg st="3" end="3"/>
+                                            </p:txEl>
+                                          </p:spTgt>
+                                        </p:tgtEl>
+                                        <p:attrNameLst>
+                                          <p:attrName>style.visibility</p:attrName>
+                                        </p:attrNameLst>
+                                      </p:cBhvr>
+                                      <p:to>
+                                        <p:strVal val="visible"/>
+                                      </p:to>
+                                    </p:set>
+                                  </p:childTnLst>
+                                </p:cTn>
+                              </p:par>
+                              <p:par>
+                                <p:cTn id="13" presetID="1" presetClass="entr" presetSubtype="0" fill="hold" grpId="0" nodeType="withEffect">
+                                  <p:stCondLst>
+                                    <p:cond delay="0"/>
+                                  </p:stCondLst>
+                                  <p:childTnLst>
+                                    <p:set>
+                                      <p:cBhvr>
+                                        <p:cTn id="14" dur="1" fill="hold">
+                                          <p:stCondLst>
+                                            <p:cond delay="0"/>
+                                          </p:stCondLst>
+                                        </p:cTn>
+                                        <p:tgtEl>
+                                          <p:spTgt spid="3">
+                                            <p:txEl>
+                                              <p:pRg st="4" end="4"/>
+                                            </p:txEl>
+                                          </p:spTgt>
+                                        </p:tgtEl>
+                                        <p:attrNameLst>
+                                          <p:attrName>style.visibility</p:attrName>
+                                        </p:attrNameLst>
+                                      </p:cBhvr>
+                                      <p:to>
+                                        <p:strVal val="visible"/>
+                                      </p:to>
+                                    </p:set>
+                                  </p:childTnLst>
+                                </p:cTn>
+                              </p:par>
+                              <p:par>
+                                <p:cTn id="15" presetID="1" presetClass="entr" presetSubtype="0" fill="hold" grpId="0" nodeType="withEffect">
+                                  <p:stCondLst>
+                                    <p:cond delay="0"/>
+                                  </p:stCondLst>
+                                  <p:childTnLst>
+                                    <p:set>
+                                      <p:cBhvr>
+                                        <p:cTn id="16" dur="1" fill="hold">
+                                          <p:stCondLst>
+                                            <p:cond delay="0"/>
+                                          </p:stCondLst>
+                                        </p:cTn>
+                                        <p:tgtEl>
+                                          <p:spTgt spid="3">
+                                            <p:txEl>
+                                              <p:pRg st="5" end="5"/>
+                                            </p:txEl>
+                                          </p:spTgt>
+                                        </p:tgtEl>
+                                        <p:attrNameLst>
+                                          <p:attrName>style.visibility</p:attrName>
+                                        </p:attrNameLst>
+                                      </p:cBhvr>
+                                      <p:to>
+                                        <p:strVal val="visible"/>
+                                      </p:to>
+                                    </p:set>
+                                  </p:childTnLst>
+                                </p:cTn>
+                              </p:par>
+                              <p:par>
+                                <p:cTn id="17" presetID="1" presetClass="entr" presetSubtype="0" fill="hold" grpId="0" nodeType="withEffect">
+                                  <p:stCondLst>
+                                    <p:cond delay="0"/>
+                                  </p:stCondLst>
+                                  <p:childTnLst>
+                                    <p:set>
+                                      <p:cBhvr>
+                                        <p:cTn id="18" dur="1" fill="hold">
+                                          <p:stCondLst>
+                                            <p:cond delay="0"/>
+                                          </p:stCondLst>
+                                        </p:cTn>
+                                        <p:tgtEl>
+                                          <p:spTgt spid="3">
+                                            <p:txEl>
+                                              <p:pRg st="6" end="6"/>
+                                            </p:txEl>
+                                          </p:spTgt>
+                                        </p:tgtEl>
+                                        <p:attrNameLst>
+                                          <p:attrName>style.visibility</p:attrName>
+                                        </p:attrNameLst>
+                                      </p:cBhvr>
+                                      <p:to>
+                                        <p:strVal val="visible"/>
+                                      </p:to>
+                                    </p:set>
+                                  </p:childTnLst>
+                                </p:cTn>
+                              </p:par>
+                            </p:childTnLst>
+                          </p:cTn>
+                        </p:par>
+                      </p:childTnLst>
+                    </p:cTn>
+                  </p:par>
+                </p:childTnLst>
+              </p:cTn>
+              <p:prevCondLst>
+                <p:cond evt="onPrev" delay="0">
+                  <p:tgtEl>
+                    <p:sldTgt/>
+                  </p:tgtEl>
+                </p:cond>
+              </p:prevCondLst>
+              <p:nextCondLst>
+                <p:cond evt="onNext" delay="0">
+                  <p:tgtEl>
+                    <p:sldTgt/>
+                  </p:tgtEl>
+                </p:cond>
+              </p:nextCondLst>
+            </p:seq>
+          </p:childTnLst>
+        </p:cTn>
+      </p:par>
+    </p:tnLst>
+    <p:bldLst>
+      <p:bldP spid="3" grpId="0" build="p"/>
+    </p:bldLst>
+  </p:timing>
+</p:sld>
+</file>
+
+<file path=ppt/slides/slide5.xml><?xml version="1.0" encoding="utf-8"?>
+<p:sld xmlns:a="http://schemas.openxmlformats.org/drawingml/2006/main" xmlns:r="http://schemas.openxmlformats.org/officeDocument/2006/relationships" xmlns:p="http://schemas.openxmlformats.org/presentationml/2006/main">
+  <p:cSld>
+    <p:spTree>
+      <p:nvGrpSpPr>
+        <p:cNvPr id="1" name=""/>
+        <p:cNvGrpSpPr/>
+        <p:nvPr/>
+      </p:nvGrpSpPr>
+      <p:grpSpPr>
+        <a:xfrm>
+          <a:off x="0" y="0"/>
+          <a:ext cx="0" cy="0"/>
+          <a:chOff x="0" y="0"/>
+          <a:chExt cx="0" cy="0"/>
+        </a:xfrm>
+      </p:grpSpPr>
+      <p:sp>
+        <p:nvSpPr>
+          <p:cNvPr id="2" name="Titel 1"/>
+          <p:cNvSpPr>
+            <a:spLocks noGrp="1"/>
+          </p:cNvSpPr>
+          <p:nvPr>
+            <p:ph type="title"/>
+          </p:nvPr>
+        </p:nvSpPr>
+        <p:spPr/>
+        <p:txBody>
+          <a:bodyPr/>
+          <a:lstStyle/>
+          <a:p>
+            <a:r>
+              <a:rPr lang="en-US"/>
+              <a:t>Tag </a:t>
+            </a:r>
+            <a:r>
+              <a:rPr lang="en-US" smtClean="0"/>
+              <a:t>3: </a:t>
             </a:r>
             <a:r>
               <a:rPr lang="en-US" dirty="0" err="1"/>
@@ -11507,8 +12081,21 @@
             </a:r>
             <a:r>
               <a:rPr lang="en-US" dirty="0"/>
-              <a:t> und Warm Up</a:t>
-            </a:r>
+              <a:t> und </a:t>
+            </a:r>
+            <a:r>
+              <a:rPr lang="en-US"/>
+              <a:t>Warm </a:t>
+            </a:r>
+            <a:r>
+              <a:rPr lang="en-US" smtClean="0"/>
+              <a:t>Up (</a:t>
+            </a:r>
+            <a:r>
+              <a:rPr lang="en-US" smtClean="0"/>
+              <a:t>II)</a:t>
+            </a:r>
+            <a:endParaRPr lang="en-US" dirty="0"/>
           </a:p>
         </p:txBody>
       </p:sp>
@@ -11569,15 +12156,109 @@
               <a:t> </a:t>
             </a:r>
             <a:r>
-              <a:rPr lang="en-US" b="1" dirty="0" err="1" smtClean="0"/>
+              <a:rPr lang="en-US" b="1" err="1" smtClean="0"/>
               <a:t>auftreten</a:t>
             </a:r>
             <a:r>
-              <a:rPr lang="en-US" b="1" dirty="0" smtClean="0"/>
+              <a:rPr lang="en-US" b="1" smtClean="0"/>
               <a:t>?</a:t>
             </a:r>
           </a:p>
           <a:p>
+            <a:endParaRPr lang="en-US" b="1"/>
+          </a:p>
+          <a:p>
+            <a:endParaRPr lang="en-US" b="1" smtClean="0"/>
+          </a:p>
+          <a:p>
+            <a:endParaRPr lang="en-US" b="1"/>
+          </a:p>
+          <a:p>
+            <a:endParaRPr lang="en-US" b="1" smtClean="0"/>
+          </a:p>
+          <a:p>
+            <a:endParaRPr lang="en-US" b="1"/>
+          </a:p>
+          <a:p>
+            <a:endParaRPr lang="en-US" b="1" smtClean="0"/>
+          </a:p>
+          <a:p>
+            <a:endParaRPr lang="en-US" b="1"/>
+          </a:p>
+          <a:p>
+            <a:pPr eaLnBrk="1" hangingPunct="1">
+              <a:spcBef>
+                <a:spcPct val="0"/>
+              </a:spcBef>
+            </a:pPr>
+            <a:r>
+              <a:rPr lang="de-DE" altLang="de-DE" b="1" smtClean="0"/>
+              <a:t>* und &amp;</a:t>
+            </a:r>
+          </a:p>
+          <a:p>
+            <a:pPr lvl="1" eaLnBrk="1" hangingPunct="1">
+              <a:spcBef>
+                <a:spcPct val="0"/>
+              </a:spcBef>
+            </a:pPr>
+            <a:r>
+              <a:rPr lang="de-DE" altLang="de-DE" smtClean="0"/>
+              <a:t>Welche </a:t>
+            </a:r>
+            <a:r>
+              <a:rPr lang="de-DE" altLang="de-DE" b="1"/>
+              <a:t>Bedeutung</a:t>
+            </a:r>
+            <a:r>
+              <a:rPr lang="de-DE" altLang="de-DE"/>
+              <a:t> kann der Asterisk (</a:t>
+            </a:r>
+            <a:r>
+              <a:rPr lang="de-DE" altLang="de-DE">
+                <a:latin typeface="Courier New" panose="02070309020205020404" pitchFamily="49" charset="0"/>
+                <a:cs typeface="Courier New" panose="02070309020205020404" pitchFamily="49" charset="0"/>
+              </a:rPr>
+              <a:t>*</a:t>
+            </a:r>
+            <a:r>
+              <a:rPr lang="de-DE" altLang="de-DE"/>
+              <a:t>) im Code annehmen?</a:t>
+            </a:r>
+          </a:p>
+          <a:p>
+            <a:pPr lvl="1" eaLnBrk="1" hangingPunct="1">
+              <a:spcBef>
+                <a:spcPct val="0"/>
+              </a:spcBef>
+            </a:pPr>
+            <a:r>
+              <a:rPr lang="de-DE" altLang="de-DE" smtClean="0"/>
+              <a:t>Welche </a:t>
+            </a:r>
+            <a:r>
+              <a:rPr lang="de-DE" altLang="de-DE" b="1"/>
+              <a:t>Bedeutung</a:t>
+            </a:r>
+            <a:r>
+              <a:rPr lang="de-DE" altLang="de-DE"/>
+              <a:t> kann das Ampersand (</a:t>
+            </a:r>
+            <a:r>
+              <a:rPr lang="de-DE" altLang="de-DE">
+                <a:latin typeface="Courier New" panose="02070309020205020404" pitchFamily="49" charset="0"/>
+                <a:cs typeface="Courier New" panose="02070309020205020404" pitchFamily="49" charset="0"/>
+              </a:rPr>
+              <a:t>&amp;</a:t>
+            </a:r>
+            <a:r>
+              <a:rPr lang="de-DE" altLang="de-DE"/>
+              <a:t>) im Code annehmen</a:t>
+            </a:r>
+            <a:r>
+              <a:rPr lang="de-DE" altLang="de-DE" smtClean="0"/>
+              <a:t>?</a:t>
+            </a:r>
             <a:endParaRPr lang="en-US" b="1" dirty="0"/>
           </a:p>
           <a:p>
@@ -12089,7 +12770,7 @@
 </p:sld>
 </file>
 
-<file path=ppt/slides/slide5.xml><?xml version="1.0" encoding="utf-8"?>
+<file path=ppt/slides/slide6.xml><?xml version="1.0" encoding="utf-8"?>
 <p:sld xmlns:a="http://schemas.openxmlformats.org/drawingml/2006/main" xmlns:r="http://schemas.openxmlformats.org/officeDocument/2006/relationships" xmlns:p="http://schemas.openxmlformats.org/presentationml/2006/main">
   <p:cSld>
     <p:spTree>
@@ -12131,7 +12812,19 @@
             </a:r>
             <a:r>
               <a:rPr lang="en-US" dirty="0" smtClean="0"/>
-              <a:t> und Warm Up</a:t>
+              <a:t> und </a:t>
+            </a:r>
+            <a:r>
+              <a:rPr lang="en-US" smtClean="0"/>
+              <a:t>Warm Up (</a:t>
+            </a:r>
+            <a:r>
+              <a:rPr lang="en-US" smtClean="0"/>
+              <a:t>III</a:t>
+            </a:r>
+            <a:r>
+              <a:rPr lang="en-US" smtClean="0"/>
+              <a:t>)</a:t>
             </a:r>
             <a:endParaRPr lang="en-US" dirty="0"/>
           </a:p>
@@ -12377,198 +13070,6 @@
 </p:sld>
 </file>
 
-<file path=ppt/slides/slide6.xml><?xml version="1.0" encoding="utf-8"?>
-<p:sld xmlns:a="http://schemas.openxmlformats.org/drawingml/2006/main" xmlns:r="http://schemas.openxmlformats.org/officeDocument/2006/relationships" xmlns:p="http://schemas.openxmlformats.org/presentationml/2006/main">
-  <p:cSld>
-    <p:spTree>
-      <p:nvGrpSpPr>
-        <p:cNvPr id="1" name=""/>
-        <p:cNvGrpSpPr/>
-        <p:nvPr/>
-      </p:nvGrpSpPr>
-      <p:grpSpPr>
-        <a:xfrm>
-          <a:off x="0" y="0"/>
-          <a:ext cx="0" cy="0"/>
-          <a:chOff x="0" y="0"/>
-          <a:chExt cx="0" cy="0"/>
-        </a:xfrm>
-      </p:grpSpPr>
-      <p:sp>
-        <p:nvSpPr>
-          <p:cNvPr id="15362" name="Titel 1"/>
-          <p:cNvSpPr>
-            <a:spLocks noGrp="1"/>
-          </p:cNvSpPr>
-          <p:nvPr>
-            <p:ph type="title"/>
-          </p:nvPr>
-        </p:nvSpPr>
-        <p:spPr/>
-        <p:txBody>
-          <a:bodyPr/>
-          <a:lstStyle/>
-          <a:p>
-            <a:r>
-              <a:rPr lang="de-DE" altLang="de-DE"/>
-              <a:t>Tag 3:</a:t>
-            </a:r>
-            <a:r>
-              <a:rPr lang="de-DE" altLang="de-DE" smtClean="0">
-                <a:latin typeface="Consolas" panose="020B0609020204030204" pitchFamily="49" charset="0"/>
-                <a:cs typeface="Consolas" panose="020B0609020204030204" pitchFamily="49" charset="0"/>
-              </a:rPr>
-              <a:t> *</a:t>
-            </a:r>
-            <a:r>
-              <a:rPr lang="de-DE" altLang="de-DE" smtClean="0"/>
-              <a:t> </a:t>
-            </a:r>
-            <a:r>
-              <a:rPr lang="de-DE" altLang="de-DE" dirty="0" smtClean="0"/>
-              <a:t>und </a:t>
-            </a:r>
-            <a:r>
-              <a:rPr lang="de-DE" altLang="de-DE" dirty="0" smtClean="0">
-                <a:latin typeface="Consolas" panose="020B0609020204030204" pitchFamily="49" charset="0"/>
-                <a:cs typeface="Consolas" panose="020B0609020204030204" pitchFamily="49" charset="0"/>
-              </a:rPr>
-              <a:t>&amp;</a:t>
-            </a:r>
-          </a:p>
-        </p:txBody>
-      </p:sp>
-      <p:sp>
-        <p:nvSpPr>
-          <p:cNvPr id="2" name="Inhaltsplatzhalter 1"/>
-          <p:cNvSpPr>
-            <a:spLocks noGrp="1"/>
-          </p:cNvSpPr>
-          <p:nvPr>
-            <p:ph idx="1"/>
-          </p:nvPr>
-        </p:nvSpPr>
-        <p:spPr/>
-        <p:txBody>
-          <a:bodyPr/>
-          <a:lstStyle/>
-          <a:p>
-            <a:pPr eaLnBrk="1" hangingPunct="1">
-              <a:spcBef>
-                <a:spcPct val="0"/>
-              </a:spcBef>
-            </a:pPr>
-            <a:r>
-              <a:rPr lang="de-DE" altLang="de-DE" smtClean="0"/>
-              <a:t>Welche </a:t>
-            </a:r>
-            <a:r>
-              <a:rPr lang="de-DE" altLang="de-DE" b="1"/>
-              <a:t>Bedeutung</a:t>
-            </a:r>
-            <a:r>
-              <a:rPr lang="de-DE" altLang="de-DE"/>
-              <a:t> kann der Asterisk (</a:t>
-            </a:r>
-            <a:r>
-              <a:rPr lang="de-DE" altLang="de-DE">
-                <a:latin typeface="Courier New" panose="02070309020205020404" pitchFamily="49" charset="0"/>
-                <a:cs typeface="Courier New" panose="02070309020205020404" pitchFamily="49" charset="0"/>
-              </a:rPr>
-              <a:t>*</a:t>
-            </a:r>
-            <a:r>
-              <a:rPr lang="de-DE" altLang="de-DE"/>
-              <a:t>) im Code annehmen?</a:t>
-            </a:r>
-          </a:p>
-          <a:p>
-            <a:pPr eaLnBrk="1" hangingPunct="1">
-              <a:spcBef>
-                <a:spcPct val="0"/>
-              </a:spcBef>
-            </a:pPr>
-            <a:endParaRPr lang="de-DE" altLang="de-DE"/>
-          </a:p>
-          <a:p>
-            <a:pPr eaLnBrk="1" hangingPunct="1">
-              <a:spcBef>
-                <a:spcPct val="0"/>
-              </a:spcBef>
-            </a:pPr>
-            <a:endParaRPr lang="de-DE" altLang="de-DE"/>
-          </a:p>
-          <a:p>
-            <a:pPr eaLnBrk="1" hangingPunct="1">
-              <a:spcBef>
-                <a:spcPct val="0"/>
-              </a:spcBef>
-            </a:pPr>
-            <a:r>
-              <a:rPr lang="de-DE" altLang="de-DE"/>
-              <a:t>Welche </a:t>
-            </a:r>
-            <a:r>
-              <a:rPr lang="de-DE" altLang="de-DE" b="1"/>
-              <a:t>Bedeutung</a:t>
-            </a:r>
-            <a:r>
-              <a:rPr lang="de-DE" altLang="de-DE"/>
-              <a:t> kann das Ampersand (</a:t>
-            </a:r>
-            <a:r>
-              <a:rPr lang="de-DE" altLang="de-DE">
-                <a:latin typeface="Courier New" panose="02070309020205020404" pitchFamily="49" charset="0"/>
-                <a:cs typeface="Courier New" panose="02070309020205020404" pitchFamily="49" charset="0"/>
-              </a:rPr>
-              <a:t>&amp;</a:t>
-            </a:r>
-            <a:r>
-              <a:rPr lang="de-DE" altLang="de-DE"/>
-              <a:t>) im Code annehmen?</a:t>
-            </a:r>
-          </a:p>
-          <a:p>
-            <a:pPr eaLnBrk="1" hangingPunct="1">
-              <a:spcBef>
-                <a:spcPct val="0"/>
-              </a:spcBef>
-            </a:pPr>
-            <a:endParaRPr lang="de-DE" altLang="de-DE"/>
-          </a:p>
-          <a:p>
-            <a:endParaRPr lang="en-US"/>
-          </a:p>
-        </p:txBody>
-      </p:sp>
-    </p:spTree>
-    <p:extLst>
-      <p:ext uri="{BB962C8B-B14F-4D97-AF65-F5344CB8AC3E}">
-        <p14:creationId xmlns:p14="http://schemas.microsoft.com/office/powerpoint/2010/main" val="1677156006"/>
-      </p:ext>
-    </p:extLst>
-  </p:cSld>
-  <p:clrMapOvr>
-    <a:masterClrMapping/>
-  </p:clrMapOvr>
-  <mc:AlternateContent xmlns:mc="http://schemas.openxmlformats.org/markup-compatibility/2006" xmlns:p14="http://schemas.microsoft.com/office/powerpoint/2010/main">
-    <mc:Choice Requires="p14">
-      <p:transition spd="slow" p14:dur="2000"/>
-    </mc:Choice>
-    <mc:Fallback xmlns="">
-      <p:transition spd="slow"/>
-    </mc:Fallback>
-  </mc:AlternateContent>
-  <p:timing>
-    <p:tnLst>
-      <p:par>
-        <p:cTn id="1" dur="indefinite" restart="never" nodeType="tmRoot"/>
-      </p:par>
-    </p:tnLst>
-  </p:timing>
-</p:sld>
-</file>
-
 <file path=ppt/slides/slide7.xml><?xml version="1.0" encoding="utf-8"?>
 <p:sld xmlns:a="http://schemas.openxmlformats.org/drawingml/2006/main" xmlns:r="http://schemas.openxmlformats.org/officeDocument/2006/relationships" xmlns:p="http://schemas.openxmlformats.org/presentationml/2006/main">
   <p:cSld>
@@ -12602,10 +13103,31 @@
           <a:lstStyle/>
           <a:p>
             <a:r>
+              <a:rPr lang="de-DE" altLang="de-DE"/>
+              <a:t>Tag 3:</a:t>
+            </a:r>
+            <a:r>
+              <a:rPr lang="de-DE" altLang="de-DE" smtClean="0">
+                <a:latin typeface="Consolas" panose="020B0609020204030204" pitchFamily="49" charset="0"/>
+                <a:cs typeface="Consolas" panose="020B0609020204030204" pitchFamily="49" charset="0"/>
+              </a:rPr>
+              <a:t> *</a:t>
+            </a:r>
+            <a:r>
               <a:rPr lang="de-DE" altLang="de-DE" smtClean="0"/>
-              <a:t>Tag 4: Rückschau und Aufwärmübungen</a:t>
-            </a:r>
-            <a:endParaRPr lang="de-DE" altLang="de-DE" dirty="0" smtClean="0"/>
+              <a:t> </a:t>
+            </a:r>
+            <a:r>
+              <a:rPr lang="de-DE" altLang="de-DE" dirty="0" smtClean="0"/>
+              <a:t>und </a:t>
+            </a:r>
+            <a:r>
+              <a:rPr lang="de-DE" altLang="de-DE" dirty="0" smtClean="0">
+                <a:latin typeface="Consolas" panose="020B0609020204030204" pitchFamily="49" charset="0"/>
+                <a:cs typeface="Consolas" panose="020B0609020204030204" pitchFamily="49" charset="0"/>
+              </a:rPr>
+              <a:t>&amp;</a:t>
+            </a:r>
           </a:p>
         </p:txBody>
       </p:sp>
@@ -12624,56 +13146,98 @@
           <a:bodyPr/>
           <a:lstStyle/>
           <a:p>
-            <a:r>
-              <a:rPr lang="de-DE" altLang="de-DE" b="1" smtClean="0"/>
-              <a:t>Übrigens</a:t>
-            </a:r>
+            <a:pPr eaLnBrk="1" hangingPunct="1">
+              <a:spcBef>
+                <a:spcPct val="0"/>
+              </a:spcBef>
+            </a:pPr>
             <a:r>
               <a:rPr lang="de-DE" altLang="de-DE" smtClean="0"/>
-              <a:t>: Nicht vergessen, hin und wieder mal zu pullen</a:t>
-            </a:r>
-          </a:p>
-          <a:p>
-            <a:pPr marL="342900" indent="-342900">
-              <a:buFontTx/>
-              <a:buChar char="-"/>
+              <a:t>Welche </a:t>
+            </a:r>
+            <a:r>
+              <a:rPr lang="de-DE" altLang="de-DE" b="1"/>
+              <a:t>Bedeutung</a:t>
+            </a:r>
+            <a:r>
+              <a:rPr lang="de-DE" altLang="de-DE"/>
+              <a:t> kann der Asterisk (</a:t>
+            </a:r>
+            <a:r>
+              <a:rPr lang="de-DE" altLang="de-DE">
+                <a:latin typeface="Courier New" panose="02070309020205020404" pitchFamily="49" charset="0"/>
+                <a:cs typeface="Courier New" panose="02070309020205020404" pitchFamily="49" charset="0"/>
+              </a:rPr>
+              <a:t>*</a:t>
+            </a:r>
+            <a:r>
+              <a:rPr lang="de-DE" altLang="de-DE"/>
+              <a:t>) im Code annehmen?</a:t>
+            </a:r>
+          </a:p>
+          <a:p>
+            <a:pPr eaLnBrk="1" hangingPunct="1">
+              <a:spcBef>
+                <a:spcPct val="0"/>
+              </a:spcBef>
             </a:pPr>
-            <a:r>
-              <a:rPr lang="de-DE" altLang="de-DE" smtClean="0"/>
-              <a:t>Beide Repositories</a:t>
-            </a:r>
-          </a:p>
-          <a:p>
-            <a:pPr marL="342900" indent="-342900">
-              <a:buFontTx/>
-              <a:buChar char="-"/>
+            <a:endParaRPr lang="de-DE" altLang="de-DE"/>
+          </a:p>
+          <a:p>
+            <a:pPr eaLnBrk="1" hangingPunct="1">
+              <a:spcBef>
+                <a:spcPct val="0"/>
+              </a:spcBef>
             </a:pPr>
-            <a:r>
-              <a:rPr lang="de-DE" b="1" smtClean="0"/>
-              <a:t>Eher </a:t>
-            </a:r>
-            <a:r>
-              <a:rPr lang="de-DE" b="1"/>
-              <a:t>kleine Bugfixes.</a:t>
-            </a:r>
-            <a:endParaRPr lang="en-US" b="1"/>
-          </a:p>
-          <a:p>
-            <a:pPr marL="342900" indent="-342900">
-              <a:buFontTx/>
-              <a:buChar char="-"/>
+            <a:endParaRPr lang="de-DE" altLang="de-DE"/>
+          </a:p>
+          <a:p>
+            <a:pPr eaLnBrk="1" hangingPunct="1">
+              <a:spcBef>
+                <a:spcPct val="0"/>
+              </a:spcBef>
             </a:pPr>
             <a:r>
-              <a:rPr lang="de-DE" smtClean="0"/>
-              <a:t>Foliennummerierung sollte stabil bleiben</a:t>
-            </a:r>
+              <a:rPr lang="de-DE" altLang="de-DE"/>
+              <a:t>Welche </a:t>
+            </a:r>
+            <a:r>
+              <a:rPr lang="de-DE" altLang="de-DE" b="1"/>
+              <a:t>Bedeutung</a:t>
+            </a:r>
+            <a:r>
+              <a:rPr lang="de-DE" altLang="de-DE"/>
+              <a:t> kann das Ampersand (</a:t>
+            </a:r>
+            <a:r>
+              <a:rPr lang="de-DE" altLang="de-DE">
+                <a:latin typeface="Courier New" panose="02070309020205020404" pitchFamily="49" charset="0"/>
+                <a:cs typeface="Courier New" panose="02070309020205020404" pitchFamily="49" charset="0"/>
+              </a:rPr>
+              <a:t>&amp;</a:t>
+            </a:r>
+            <a:r>
+              <a:rPr lang="de-DE" altLang="de-DE"/>
+              <a:t>) im Code annehmen?</a:t>
+            </a:r>
+          </a:p>
+          <a:p>
+            <a:pPr eaLnBrk="1" hangingPunct="1">
+              <a:spcBef>
+                <a:spcPct val="0"/>
+              </a:spcBef>
+            </a:pPr>
+            <a:endParaRPr lang="de-DE" altLang="de-DE"/>
+          </a:p>
+          <a:p>
+            <a:endParaRPr lang="en-US"/>
           </a:p>
         </p:txBody>
       </p:sp>
     </p:spTree>
     <p:extLst>
       <p:ext uri="{BB962C8B-B14F-4D97-AF65-F5344CB8AC3E}">
-        <p14:creationId xmlns:p14="http://schemas.microsoft.com/office/powerpoint/2010/main" val="1170982419"/>
+        <p14:creationId xmlns:p14="http://schemas.microsoft.com/office/powerpoint/2010/main" val="1677156006"/>
       </p:ext>
     </p:extLst>
   </p:cSld>
@@ -12732,7 +13296,7 @@
           <a:p>
             <a:r>
               <a:rPr lang="de-DE" altLang="de-DE" smtClean="0"/>
-              <a:t>Tag 5: Rückschau und Aufwärmübungen</a:t>
+              <a:t>Tag 4: Rückschau und Aufwärmübungen</a:t>
             </a:r>
             <a:endParaRPr lang="de-DE" altLang="de-DE" dirty="0" smtClean="0"/>
           </a:p>
@@ -12750,144 +13314,59 @@
         </p:nvSpPr>
         <p:spPr/>
         <p:txBody>
-          <a:bodyPr>
-            <a:normAutofit fontScale="92500" lnSpcReduction="10000"/>
-          </a:bodyPr>
+          <a:bodyPr/>
           <a:lstStyle/>
           <a:p>
             <a:r>
               <a:rPr lang="de-DE" altLang="de-DE" b="1" smtClean="0"/>
-              <a:t>Aufgabe T4A4.5 ist NICHT optional</a:t>
-            </a:r>
-          </a:p>
-          <a:p>
-            <a:pPr lvl="1"/>
+              <a:t>Übrigens</a:t>
+            </a:r>
             <a:r>
               <a:rPr lang="de-DE" altLang="de-DE" smtClean="0"/>
-              <a:t>Fehler unsererseits – neue Version is online.</a:t>
-            </a:r>
-          </a:p>
-          <a:p>
-            <a:pPr lvl="1"/>
+              <a:t>: Nicht vergessen, hin und wieder mal zu pullen</a:t>
+            </a:r>
+          </a:p>
+          <a:p>
+            <a:pPr marL="342900" indent="-342900">
+              <a:buFontTx/>
+              <a:buChar char="-"/>
+            </a:pPr>
             <a:r>
               <a:rPr lang="de-DE" altLang="de-DE" smtClean="0"/>
-              <a:t>Noch ein Grund, regelmäßig zu pullen.</a:t>
-            </a:r>
-          </a:p>
-          <a:p>
-            <a:endParaRPr lang="de-DE" altLang="de-DE" b="1" smtClean="0"/>
-          </a:p>
-          <a:p>
-            <a:r>
-              <a:rPr lang="de-DE" altLang="de-DE" b="1" smtClean="0"/>
-              <a:t>Der Foliensatz für die zweite Woche wird zusätzliche Folien enthalten</a:t>
-            </a:r>
-          </a:p>
-          <a:p>
-            <a:pPr lvl="1"/>
-            <a:r>
-              <a:rPr lang="de-DE" altLang="de-DE" smtClean="0"/>
-              <a:t>Siehe "Folien-Brutkasten" im aktuellen Foliensatz, </a:t>
-            </a:r>
-            <a:r>
-              <a:rPr lang="en-US" smtClean="0"/>
-              <a:t>2016-09-15 in den Kommentaren</a:t>
-            </a:r>
-            <a:endParaRPr lang="de-DE" altLang="de-DE"/>
-          </a:p>
-          <a:p>
-            <a:endParaRPr lang="de-DE" altLang="de-DE" b="1"/>
-          </a:p>
-          <a:p>
-            <a:r>
-              <a:rPr lang="de-DE" altLang="de-DE" b="1" smtClean="0"/>
-              <a:t>In der VM fehlen evtl. Header für die µC-Projekte.</a:t>
-            </a:r>
-          </a:p>
-          <a:p>
-            <a:pPr lvl="1"/>
+              <a:t>Beide Repositories</a:t>
+            </a:r>
+          </a:p>
+          <a:p>
+            <a:pPr marL="342900" indent="-342900">
+              <a:buFontTx/>
+              <a:buChar char="-"/>
+            </a:pPr>
+            <a:r>
+              <a:rPr lang="de-DE" b="1" smtClean="0"/>
+              <a:t>Eher </a:t>
+            </a:r>
+            <a:r>
+              <a:rPr lang="de-DE" b="1"/>
+              <a:t>kleine Bugfixes.</a:t>
+            </a:r>
+            <a:endParaRPr lang="en-US" b="1"/>
+          </a:p>
+          <a:p>
+            <a:pPr marL="342900" indent="-342900">
+              <a:buFontTx/>
+              <a:buChar char="-"/>
+            </a:pPr>
             <a:r>
               <a:rPr lang="de-DE" smtClean="0"/>
-              <a:t>Bitte innerhalb des …exercises-Repos folgende Befehle aufrufen:</a:t>
-            </a:r>
-          </a:p>
-          <a:p>
-            <a:pPr lvl="2"/>
-            <a:r>
-              <a:rPr lang="en-US">
-                <a:latin typeface="Consolas" panose="020B0609020204030204" pitchFamily="49" charset="0"/>
-                <a:cs typeface="Consolas" panose="020B0609020204030204" pitchFamily="49" charset="0"/>
-              </a:rPr>
-              <a:t>git submodule </a:t>
-            </a:r>
-            <a:r>
-              <a:rPr lang="en-US" smtClean="0">
-                <a:latin typeface="Consolas" panose="020B0609020204030204" pitchFamily="49" charset="0"/>
-                <a:cs typeface="Consolas" panose="020B0609020204030204" pitchFamily="49" charset="0"/>
-              </a:rPr>
-              <a:t>init</a:t>
-            </a:r>
-          </a:p>
-          <a:p>
-            <a:pPr lvl="2"/>
-            <a:r>
-              <a:rPr lang="en-US">
-                <a:latin typeface="Consolas" panose="020B0609020204030204" pitchFamily="49" charset="0"/>
-                <a:cs typeface="Consolas" panose="020B0609020204030204" pitchFamily="49" charset="0"/>
-              </a:rPr>
-              <a:t>git submodule update </a:t>
-            </a:r>
-            <a:r>
-              <a:rPr lang="en-US" smtClean="0">
-                <a:latin typeface="Consolas" panose="020B0609020204030204" pitchFamily="49" charset="0"/>
-                <a:cs typeface="Consolas" panose="020B0609020204030204" pitchFamily="49" charset="0"/>
-              </a:rPr>
-              <a:t>--recursive</a:t>
-            </a:r>
-            <a:endParaRPr lang="en-US">
-              <a:latin typeface="Consolas" panose="020B0609020204030204" pitchFamily="49" charset="0"/>
-              <a:cs typeface="Consolas" panose="020B0609020204030204" pitchFamily="49" charset="0"/>
-            </a:endParaRPr>
-          </a:p>
-          <a:p>
-            <a:pPr indent="-168275"/>
-            <a:endParaRPr lang="en-US" b="1" smtClean="0"/>
-          </a:p>
-          <a:p>
-            <a:pPr indent="-168275"/>
-            <a:r>
-              <a:rPr lang="en-US" b="1" smtClean="0"/>
-              <a:t>µC-Beispielprojekte können nicht kopiert werden</a:t>
-            </a:r>
-          </a:p>
-          <a:p>
-            <a:pPr lvl="1"/>
-            <a:r>
-              <a:rPr lang="en-US" smtClean="0"/>
-              <a:t>Nutzen relative Pfade im exercises-Repo</a:t>
-            </a:r>
-          </a:p>
-          <a:p>
-            <a:pPr lvl="1"/>
-            <a:r>
-              <a:rPr lang="en-US" smtClean="0"/>
-              <a:t>Alternative 1: Kopieren und manuell das Makefile anpassen</a:t>
-            </a:r>
-          </a:p>
-          <a:p>
-            <a:pPr lvl="1"/>
-            <a:r>
-              <a:rPr lang="en-US" smtClean="0"/>
-              <a:t>Alternative 2: Über "Create project" ein neues "FX16 project" anlegen.</a:t>
-            </a:r>
-            <a:endParaRPr lang="de-DE" smtClean="0"/>
+              <a:t>Foliennummerierung sollte stabil bleiben</a:t>
+            </a:r>
           </a:p>
         </p:txBody>
       </p:sp>
     </p:spTree>
     <p:extLst>
       <p:ext uri="{BB962C8B-B14F-4D97-AF65-F5344CB8AC3E}">
-        <p14:creationId xmlns:p14="http://schemas.microsoft.com/office/powerpoint/2010/main" val="89436420"/>
+        <p14:creationId xmlns:p14="http://schemas.microsoft.com/office/powerpoint/2010/main" val="1170982419"/>
       </p:ext>
     </p:extLst>
   </p:cSld>
@@ -12946,7 +13425,7 @@
           <a:p>
             <a:r>
               <a:rPr lang="de-DE" altLang="de-DE" smtClean="0"/>
-              <a:t>Tag 6: Evaluationsfragen</a:t>
+              <a:t>Tag 5: Rückschau und Aufwärmübungen</a:t>
             </a:r>
             <a:endParaRPr lang="de-DE" altLang="de-DE" dirty="0" smtClean="0"/>
           </a:p>
@@ -12964,106 +13443,144 @@
         </p:nvSpPr>
         <p:spPr/>
         <p:txBody>
-          <a:bodyPr/>
+          <a:bodyPr>
+            <a:normAutofit fontScale="92500" lnSpcReduction="10000"/>
+          </a:bodyPr>
           <a:lstStyle/>
           <a:p>
             <a:r>
+              <a:rPr lang="de-DE" altLang="de-DE" b="1" smtClean="0"/>
+              <a:t>Aufgabe T4A4.5 ist NICHT optional</a:t>
+            </a:r>
+          </a:p>
+          <a:p>
+            <a:pPr lvl="1"/>
+            <a:r>
+              <a:rPr lang="de-DE" altLang="de-DE" smtClean="0"/>
+              <a:t>Fehler unsererseits – neue Version is online.</a:t>
+            </a:r>
+          </a:p>
+          <a:p>
+            <a:pPr lvl="1"/>
+            <a:r>
+              <a:rPr lang="de-DE" altLang="de-DE" smtClean="0"/>
+              <a:t>Noch ein Grund, regelmäßig zu pullen.</a:t>
+            </a:r>
+          </a:p>
+          <a:p>
+            <a:endParaRPr lang="de-DE" altLang="de-DE" b="1" smtClean="0"/>
+          </a:p>
+          <a:p>
+            <a:r>
+              <a:rPr lang="de-DE" altLang="de-DE" b="1" smtClean="0"/>
+              <a:t>Der Foliensatz für die zweite Woche wird zusätzliche Folien enthalten</a:t>
+            </a:r>
+          </a:p>
+          <a:p>
+            <a:pPr lvl="1"/>
+            <a:r>
+              <a:rPr lang="de-DE" altLang="de-DE" smtClean="0"/>
+              <a:t>Siehe "Folien-Brutkasten" im aktuellen Foliensatz, </a:t>
+            </a:r>
+            <a:r>
+              <a:rPr lang="en-US" smtClean="0"/>
+              <a:t>2016-09-15 in den Kommentaren</a:t>
+            </a:r>
+            <a:endParaRPr lang="de-DE" altLang="de-DE"/>
+          </a:p>
+          <a:p>
+            <a:endParaRPr lang="de-DE" altLang="de-DE" b="1"/>
+          </a:p>
+          <a:p>
+            <a:r>
+              <a:rPr lang="de-DE" altLang="de-DE" b="1" smtClean="0"/>
+              <a:t>In der VM fehlen evtl. Header für die µC-Projekte.</a:t>
+            </a:r>
+          </a:p>
+          <a:p>
+            <a:pPr lvl="1"/>
+            <a:r>
+              <a:rPr lang="de-DE" smtClean="0"/>
+              <a:t>Bitte innerhalb des …exercises-Repos folgende Befehle aufrufen:</a:t>
+            </a:r>
+          </a:p>
+          <a:p>
+            <a:pPr lvl="2"/>
+            <a:r>
+              <a:rPr lang="en-US">
+                <a:latin typeface="Consolas" panose="020B0609020204030204" pitchFamily="49" charset="0"/>
+                <a:cs typeface="Consolas" panose="020B0609020204030204" pitchFamily="49" charset="0"/>
+              </a:rPr>
+              <a:t>git submodule </a:t>
+            </a:r>
+            <a:r>
+              <a:rPr lang="en-US" smtClean="0">
+                <a:latin typeface="Consolas" panose="020B0609020204030204" pitchFamily="49" charset="0"/>
+                <a:cs typeface="Consolas" panose="020B0609020204030204" pitchFamily="49" charset="0"/>
+              </a:rPr>
+              <a:t>init</a:t>
+            </a:r>
+          </a:p>
+          <a:p>
+            <a:pPr lvl="2"/>
+            <a:r>
+              <a:rPr lang="en-US">
+                <a:latin typeface="Consolas" panose="020B0609020204030204" pitchFamily="49" charset="0"/>
+                <a:cs typeface="Consolas" panose="020B0609020204030204" pitchFamily="49" charset="0"/>
+              </a:rPr>
+              <a:t>git submodule update </a:t>
+            </a:r>
+            <a:r>
+              <a:rPr lang="en-US" smtClean="0">
+                <a:latin typeface="Consolas" panose="020B0609020204030204" pitchFamily="49" charset="0"/>
+                <a:cs typeface="Consolas" panose="020B0609020204030204" pitchFamily="49" charset="0"/>
+              </a:rPr>
+              <a:t>--recursive</a:t>
+            </a:r>
+            <a:endParaRPr lang="en-US">
+              <a:latin typeface="Consolas" panose="020B0609020204030204" pitchFamily="49" charset="0"/>
+              <a:cs typeface="Consolas" panose="020B0609020204030204" pitchFamily="49" charset="0"/>
+            </a:endParaRPr>
+          </a:p>
+          <a:p>
+            <a:pPr indent="-168275"/>
+            <a:endParaRPr lang="en-US" b="1" smtClean="0"/>
+          </a:p>
+          <a:p>
+            <a:pPr indent="-168275"/>
+            <a:r>
               <a:rPr lang="en-US" b="1" smtClean="0"/>
-              <a:t>Fragen für die Evaluation</a:t>
+              <a:t>µC-Beispielprojekte können nicht kopiert werden</a:t>
             </a:r>
           </a:p>
           <a:p>
             <a:pPr lvl="1"/>
             <a:r>
               <a:rPr lang="en-US" smtClean="0"/>
-              <a:t>Stärkerer Fokus auf C++(11) legen (= weniger Fokus auf C</a:t>
-            </a:r>
+              <a:t>Nutzen relative Pfade im exercises-Repo</a:t>
+            </a:r>
+          </a:p>
+          <a:p>
+            <a:pPr lvl="1"/>
             <a:r>
               <a:rPr lang="en-US" smtClean="0"/>
-              <a:t>)?</a:t>
-            </a:r>
-          </a:p>
-          <a:p>
-            <a:pPr lvl="2"/>
+              <a:t>Alternative 1: Kopieren und manuell das Makefile anpassen</a:t>
+            </a:r>
+          </a:p>
+          <a:p>
+            <a:pPr lvl="1"/>
             <a:r>
               <a:rPr lang="en-US" smtClean="0"/>
-              <a:t>"trifft zu" = mehr C++</a:t>
-            </a:r>
-          </a:p>
-          <a:p>
-            <a:pPr lvl="2"/>
-            <a:r>
-              <a:rPr lang="en-US" smtClean="0"/>
-              <a:t>"Mitte" = gleich lassen</a:t>
-            </a:r>
-          </a:p>
-          <a:p>
-            <a:pPr lvl="2"/>
-            <a:r>
-              <a:rPr lang="en-US" smtClean="0"/>
-              <a:t>"trifft nicht zu" = mehr C</a:t>
-            </a:r>
-            <a:endParaRPr lang="en-US" smtClean="0"/>
-          </a:p>
-          <a:p>
-            <a:pPr lvl="1"/>
-            <a:r>
-              <a:rPr lang="en-US" smtClean="0"/>
-              <a:t>Ich hatte vorher keine C++-Kenntnisse</a:t>
-            </a:r>
-          </a:p>
-          <a:p>
-            <a:pPr lvl="2">
-              <a:tabLst>
-                <a:tab pos="2155825" algn="l"/>
-              </a:tabLst>
-            </a:pPr>
-            <a:r>
-              <a:rPr lang="en-US" smtClean="0"/>
-              <a:t>"trifft zu" 	= Keine Vorkenntnisse</a:t>
-            </a:r>
-          </a:p>
-          <a:p>
-            <a:pPr lvl="2">
-              <a:tabLst>
-                <a:tab pos="2155825" algn="l"/>
-              </a:tabLst>
-            </a:pPr>
-            <a:r>
-              <a:rPr lang="en-US" smtClean="0"/>
-              <a:t>"Mitte"	= Eigene kleinere Projekte</a:t>
-            </a:r>
-          </a:p>
-          <a:p>
-            <a:pPr lvl="2">
-              <a:tabLst>
-                <a:tab pos="2155825" algn="l"/>
-              </a:tabLst>
-            </a:pPr>
-            <a:r>
-              <a:rPr lang="en-US" smtClean="0"/>
-              <a:t>"trifft nicht zu" 	= Sehr erfahrener C++-</a:t>
-            </a:r>
-            <a:r>
-              <a:rPr lang="en-US" smtClean="0"/>
-              <a:t>Programmierer</a:t>
-            </a:r>
-          </a:p>
-          <a:p>
-            <a:pPr marL="350838" lvl="2" indent="0">
-              <a:buNone/>
-              <a:tabLst>
-                <a:tab pos="2155825" algn="l"/>
-              </a:tabLst>
-            </a:pPr>
-            <a:endParaRPr lang="en-US"/>
+              <a:t>Alternative 2: Über "Create project" ein neues "FX16 project" anlegen.</a:t>
+            </a:r>
+            <a:endParaRPr lang="de-DE" smtClean="0"/>
           </a:p>
         </p:txBody>
       </p:sp>
     </p:spTree>
     <p:extLst>
       <p:ext uri="{BB962C8B-B14F-4D97-AF65-F5344CB8AC3E}">
-        <p14:creationId xmlns:p14="http://schemas.microsoft.com/office/powerpoint/2010/main" val="509479147"/>
+        <p14:creationId xmlns:p14="http://schemas.microsoft.com/office/powerpoint/2010/main" val="89436420"/>
       </p:ext>
     </p:extLst>
   </p:cSld>

</xml_diff>

<commit_message>
Minor update of recap slides
</commit_message>
<xml_diff>
--- a/2016/recap_and_warmup_slides.pptx
+++ b/2016/recap_and_warmup_slides.pptx
@@ -11464,7 +11464,7 @@
           <a:graphicData uri="http://schemas.openxmlformats.org/presentationml/2006/ole">
             <mc:AlternateContent xmlns:mc="http://schemas.openxmlformats.org/markup-compatibility/2006">
               <mc:Choice xmlns:v="urn:schemas-microsoft-com:vml" Requires="v">
-                <p:oleObj spid="_x0000_s1960" r:id="rId16" imgW="1038370" imgH="980952" progId="">
+                <p:oleObj spid="_x0000_s1961" r:id="rId16" imgW="1038370" imgH="980952" progId="">
                   <p:embed/>
                 </p:oleObj>
               </mc:Choice>
@@ -11902,7 +11902,7 @@
                 </a:lnSpc>
                 <a:defRPr/>
               </a:pPr>
-              <a:t>20.09.2016</a:t>
+              <a:t>21.09.2016</a:t>
             </a:fld>
             <a:r>
               <a:rPr lang="en-GB" altLang="de-DE" sz="1000" smtClean="0">
@@ -14178,9 +14178,18 @@
           <a:bodyPr/>
           <a:lstStyle/>
           <a:p>
+            <a:pPr>
+              <a:tabLst>
+                <a:tab pos="2155825" algn="l"/>
+              </a:tabLst>
+            </a:pPr>
             <a:r>
               <a:rPr lang="de-DE" altLang="de-DE"/>
-              <a:t>Tag 6: Evaluationsfragen</a:t>
+              <a:t>Tag 6: </a:t>
+            </a:r>
+            <a:r>
+              <a:rPr lang="en-US"/>
+              <a:t>Hinweise zur Klausur</a:t>
             </a:r>
             <a:endParaRPr lang="en-US"/>
           </a:p>

</xml_diff>